<commit_message>
Aula 06 Cloud Computing 06042023
</commit_message>
<xml_diff>
--- a/01 Classes/Aula 06 - Computação em Nuvem e Web Services em Linux Cloud AWS.pptx
+++ b/01 Classes/Aula 06 - Computação em Nuvem e Web Services em Linux Cloud AWS.pptx
@@ -5,17 +5,18 @@
     <p:sldMasterId id="2147483648" r:id="rId1"/>
   </p:sldMasterIdLst>
   <p:notesMasterIdLst>
-    <p:notesMasterId r:id="rId10"/>
+    <p:notesMasterId r:id="rId11"/>
   </p:notesMasterIdLst>
   <p:sldIdLst>
     <p:sldId id="256" r:id="rId2"/>
     <p:sldId id="291" r:id="rId3"/>
     <p:sldId id="409" r:id="rId4"/>
-    <p:sldId id="408" r:id="rId5"/>
-    <p:sldId id="323" r:id="rId6"/>
-    <p:sldId id="334" r:id="rId7"/>
-    <p:sldId id="337" r:id="rId8"/>
-    <p:sldId id="309" r:id="rId9"/>
+    <p:sldId id="410" r:id="rId5"/>
+    <p:sldId id="408" r:id="rId6"/>
+    <p:sldId id="323" r:id="rId7"/>
+    <p:sldId id="334" r:id="rId8"/>
+    <p:sldId id="337" r:id="rId9"/>
+    <p:sldId id="309" r:id="rId10"/>
   </p:sldIdLst>
   <p:sldSz cx="9144000" cy="5143500" type="screen16x9"/>
   <p:notesSz cx="6858000" cy="9144000"/>
@@ -684,7 +685,7 @@
     </p:spTree>
     <p:extLst>
       <p:ext uri="{BB962C8B-B14F-4D97-AF65-F5344CB8AC3E}">
-        <p14:creationId xmlns:p14="http://schemas.microsoft.com/office/powerpoint/2010/main" val="3886978698"/>
+        <p14:creationId xmlns:p14="http://schemas.microsoft.com/office/powerpoint/2010/main" val="887802314"/>
       </p:ext>
     </p:extLst>
   </p:cSld>
@@ -750,7 +751,7 @@
     </p:spTree>
     <p:extLst>
       <p:ext uri="{BB962C8B-B14F-4D97-AF65-F5344CB8AC3E}">
-        <p14:creationId xmlns:p14="http://schemas.microsoft.com/office/powerpoint/2010/main" val="2709569597"/>
+        <p14:creationId xmlns:p14="http://schemas.microsoft.com/office/powerpoint/2010/main" val="3886978698"/>
       </p:ext>
     </p:extLst>
   </p:cSld>
@@ -816,6 +817,72 @@
     </p:spTree>
     <p:extLst>
       <p:ext uri="{BB962C8B-B14F-4D97-AF65-F5344CB8AC3E}">
+        <p14:creationId xmlns:p14="http://schemas.microsoft.com/office/powerpoint/2010/main" val="2709569597"/>
+      </p:ext>
+    </p:extLst>
+  </p:cSld>
+  <p:clrMapOvr>
+    <a:masterClrMapping/>
+  </p:clrMapOvr>
+</p:notes>
+</file>
+
+<file path=ppt/notesSlides/notesSlide6.xml><?xml version="1.0" encoding="utf-8"?>
+<p:notes xmlns:a="http://schemas.openxmlformats.org/drawingml/2006/main" xmlns:r="http://schemas.openxmlformats.org/officeDocument/2006/relationships" xmlns:p="http://schemas.openxmlformats.org/presentationml/2006/main">
+  <p:cSld>
+    <p:spTree>
+      <p:nvGrpSpPr>
+        <p:cNvPr id="1" name=""/>
+        <p:cNvGrpSpPr/>
+        <p:nvPr/>
+      </p:nvGrpSpPr>
+      <p:grpSpPr>
+        <a:xfrm>
+          <a:off x="0" y="0"/>
+          <a:ext cx="0" cy="0"/>
+          <a:chOff x="0" y="0"/>
+          <a:chExt cx="0" cy="0"/>
+        </a:xfrm>
+      </p:grpSpPr>
+      <p:sp>
+        <p:nvSpPr>
+          <p:cNvPr id="2" name="Espaço Reservado para Imagem de Slide 1"/>
+          <p:cNvSpPr>
+            <a:spLocks noGrp="1" noRot="1" noChangeAspect="1"/>
+          </p:cNvSpPr>
+          <p:nvPr>
+            <p:ph type="sldImg"/>
+          </p:nvPr>
+        </p:nvSpPr>
+        <p:spPr>
+          <a:xfrm>
+            <a:off x="381000" y="685800"/>
+            <a:ext cx="6096000" cy="3429000"/>
+          </a:xfrm>
+        </p:spPr>
+      </p:sp>
+      <p:sp>
+        <p:nvSpPr>
+          <p:cNvPr id="3" name="Espaço Reservado para Anotações 2"/>
+          <p:cNvSpPr>
+            <a:spLocks noGrp="1"/>
+          </p:cNvSpPr>
+          <p:nvPr>
+            <p:ph type="body" idx="1"/>
+          </p:nvPr>
+        </p:nvSpPr>
+        <p:spPr/>
+        <p:txBody>
+          <a:bodyPr/>
+          <a:lstStyle/>
+          <a:p>
+            <a:endParaRPr lang="pt-BR" dirty="0"/>
+          </a:p>
+        </p:txBody>
+      </p:sp>
+    </p:spTree>
+    <p:extLst>
+      <p:ext uri="{BB962C8B-B14F-4D97-AF65-F5344CB8AC3E}">
         <p14:creationId xmlns:p14="http://schemas.microsoft.com/office/powerpoint/2010/main" val="2296249050"/>
       </p:ext>
     </p:extLst>
@@ -826,7 +893,7 @@
 </p:notes>
 </file>
 
-<file path=ppt/notesSlides/notesSlide6.xml><?xml version="1.0" encoding="utf-8"?>
+<file path=ppt/notesSlides/notesSlide7.xml><?xml version="1.0" encoding="utf-8"?>
 <p:notes xmlns:a="http://schemas.openxmlformats.org/drawingml/2006/main" xmlns:r="http://schemas.openxmlformats.org/officeDocument/2006/relationships" xmlns:p="http://schemas.openxmlformats.org/presentationml/2006/main">
   <p:cSld>
     <p:spTree>
@@ -3950,7 +4017,7 @@
               </a:rPr>
             </a:br>
             <a:r>
-              <a:rPr lang="pt-BR" b="1">
+              <a:rPr lang="pt-BR" b="1" dirty="0">
                 <a:solidFill>
                   <a:schemeClr val="bg1"/>
                 </a:solidFill>
@@ -3978,7 +4045,7 @@
                   <a:schemeClr val="bg1"/>
                 </a:solidFill>
               </a:rPr>
-              <a:t>Cloud Computer na Prática</a:t>
+              <a:t>Cloud Computer AWS</a:t>
             </a:r>
           </a:p>
         </p:txBody>
@@ -4413,7 +4480,27 @@
                 <a:latin typeface="Times" panose="02020603050405020304" pitchFamily="18" charset="0"/>
                 <a:cs typeface="Times" panose="02020603050405020304" pitchFamily="18" charset="0"/>
               </a:rPr>
-              <a:t>g</a:t>
+              <a:t>É uma plataforma de serviços de cloud </a:t>
+            </a:r>
+            <a:r>
+              <a:rPr lang="pt-BR" sz="2400" dirty="0" err="1">
+                <a:solidFill>
+                  <a:schemeClr val="tx1"/>
+                </a:solidFill>
+                <a:latin typeface="Times" panose="02020603050405020304" pitchFamily="18" charset="0"/>
+                <a:cs typeface="Times" panose="02020603050405020304" pitchFamily="18" charset="0"/>
+              </a:rPr>
+              <a:t>computing</a:t>
+            </a:r>
+            <a:r>
+              <a:rPr lang="pt-BR" sz="2400" dirty="0">
+                <a:solidFill>
+                  <a:schemeClr val="tx1"/>
+                </a:solidFill>
+                <a:latin typeface="Times" panose="02020603050405020304" pitchFamily="18" charset="0"/>
+                <a:cs typeface="Times" panose="02020603050405020304" pitchFamily="18" charset="0"/>
+              </a:rPr>
+              <a:t> oferecida pela Amazon.com. </a:t>
             </a:r>
           </a:p>
           <a:p>
@@ -4429,9 +4516,101 @@
             </a:endParaRPr>
           </a:p>
           <a:p>
-            <a:pPr algn="just">
-              <a:buFont typeface="Wingdings" panose="05000000000000000000" pitchFamily="2" charset="2"/>
-              <a:buChar char="§"/>
+            <a:pPr marL="0" indent="0" algn="just">
+              <a:buNone/>
+            </a:pPr>
+            <a:r>
+              <a:rPr lang="pt-BR" sz="2400" dirty="0">
+                <a:solidFill>
+                  <a:schemeClr val="tx1"/>
+                </a:solidFill>
+                <a:latin typeface="Times" panose="02020603050405020304" pitchFamily="18" charset="0"/>
+                <a:cs typeface="Times" panose="02020603050405020304" pitchFamily="18" charset="0"/>
+              </a:rPr>
+              <a:t>AWS (</a:t>
+            </a:r>
+            <a:r>
+              <a:rPr lang="pt-BR" sz="2400" b="1" dirty="0" err="1">
+                <a:solidFill>
+                  <a:schemeClr val="tx1"/>
+                </a:solidFill>
+                <a:latin typeface="Times" panose="02020603050405020304" pitchFamily="18" charset="0"/>
+                <a:cs typeface="Times" panose="02020603050405020304" pitchFamily="18" charset="0"/>
+              </a:rPr>
+              <a:t>Amazon</a:t>
+            </a:r>
+            <a:r>
+              <a:rPr lang="pt-BR" sz="2400" b="1" dirty="0">
+                <a:solidFill>
+                  <a:schemeClr val="tx1"/>
+                </a:solidFill>
+                <a:latin typeface="Times" panose="02020603050405020304" pitchFamily="18" charset="0"/>
+                <a:cs typeface="Times" panose="02020603050405020304" pitchFamily="18" charset="0"/>
+              </a:rPr>
+              <a:t> Web Services</a:t>
+            </a:r>
+            <a:r>
+              <a:rPr lang="pt-BR" sz="2400" dirty="0">
+                <a:solidFill>
+                  <a:schemeClr val="tx1"/>
+                </a:solidFill>
+                <a:latin typeface="Times" panose="02020603050405020304" pitchFamily="18" charset="0"/>
+                <a:cs typeface="Times" panose="02020603050405020304" pitchFamily="18" charset="0"/>
+              </a:rPr>
+              <a:t>)</a:t>
+            </a:r>
+          </a:p>
+          <a:p>
+            <a:pPr marL="0" indent="0" algn="just">
+              <a:buNone/>
+            </a:pPr>
+            <a:r>
+              <a:rPr lang="pt-BR" sz="2400" dirty="0">
+                <a:solidFill>
+                  <a:schemeClr val="tx1"/>
+                </a:solidFill>
+                <a:latin typeface="Times" panose="02020603050405020304" pitchFamily="18" charset="0"/>
+                <a:cs typeface="Times" panose="02020603050405020304" pitchFamily="18" charset="0"/>
+              </a:rPr>
+              <a:t> </a:t>
+            </a:r>
+          </a:p>
+          <a:p>
+            <a:pPr marL="0" indent="0" algn="just">
+              <a:buNone/>
+            </a:pPr>
+            <a:r>
+              <a:rPr lang="pt-BR" sz="2400" dirty="0">
+                <a:solidFill>
+                  <a:schemeClr val="tx1"/>
+                </a:solidFill>
+                <a:latin typeface="Times" panose="02020603050405020304" pitchFamily="18" charset="0"/>
+                <a:cs typeface="Times" panose="02020603050405020304" pitchFamily="18" charset="0"/>
+              </a:rPr>
+              <a:t> 	</a:t>
+            </a:r>
+            <a:r>
+              <a:rPr lang="pt-BR" sz="2400" dirty="0">
+                <a:solidFill>
+                  <a:schemeClr val="tx1"/>
+                </a:solidFill>
+                <a:latin typeface="Times" panose="02020603050405020304" pitchFamily="18" charset="0"/>
+                <a:cs typeface="Times" panose="02020603050405020304" pitchFamily="18" charset="0"/>
+                <a:hlinkClick r:id="rId3"/>
+              </a:rPr>
+              <a:t>https://aws.amazon.com/pt/</a:t>
+            </a:r>
+            <a:endParaRPr lang="pt-BR" sz="2400" dirty="0">
+              <a:solidFill>
+                <a:schemeClr val="tx1"/>
+              </a:solidFill>
+              <a:latin typeface="Times" panose="02020603050405020304" pitchFamily="18" charset="0"/>
+              <a:cs typeface="Times" panose="02020603050405020304" pitchFamily="18" charset="0"/>
+            </a:endParaRPr>
+          </a:p>
+          <a:p>
+            <a:pPr marL="0" indent="0" algn="just">
+              <a:buNone/>
             </a:pPr>
             <a:endParaRPr lang="pt-BR" sz="1800" b="1" dirty="0">
               <a:solidFill>
@@ -4502,7 +4681,7 @@
                   <a:srgbClr val="0070C0"/>
                 </a:solidFill>
               </a:rPr>
-              <a:t>Leitura</a:t>
+              <a:t>Recursos</a:t>
             </a:r>
             <a:r>
               <a:rPr lang="en-US" b="1" dirty="0">
@@ -4518,13 +4697,16 @@
                   <a:srgbClr val="0070C0"/>
                 </a:solidFill>
               </a:rPr>
-              <a:t>Específica</a:t>
-            </a:r>
-            <a:endParaRPr lang="en-US" b="1" dirty="0">
-              <a:solidFill>
-                <a:srgbClr val="0070C0"/>
-              </a:solidFill>
-            </a:endParaRPr>
+              <a:t>Computacionais</a:t>
+            </a:r>
+            <a:r>
+              <a:rPr lang="en-US" b="1" dirty="0">
+                <a:solidFill>
+                  <a:srgbClr val="0070C0"/>
+                </a:solidFill>
+              </a:rPr>
+              <a:t> AWS</a:t>
+            </a:r>
           </a:p>
         </p:txBody>
       </p:sp>
@@ -4540,8 +4722,8 @@
         </p:nvSpPr>
         <p:spPr>
           <a:xfrm>
-            <a:off x="142865" y="1200151"/>
-            <a:ext cx="8865056" cy="3394472"/>
+            <a:off x="142865" y="1200150"/>
+            <a:ext cx="8865056" cy="3847338"/>
           </a:xfrm>
         </p:spPr>
         <p:txBody>
@@ -4550,130 +4732,189 @@
           </a:bodyPr>
           <a:lstStyle/>
           <a:p>
-            <a:pPr marL="0" indent="0" algn="just">
-              <a:buNone/>
+            <a:pPr algn="just">
+              <a:buFont typeface="Wingdings" panose="05000000000000000000" pitchFamily="2" charset="2"/>
+              <a:buChar char="§"/>
             </a:pPr>
             <a:r>
               <a:rPr lang="pt-BR" sz="2000" dirty="0">
-                <a:latin typeface="Times New Roman" panose="02020603050405020304" pitchFamily="18" charset="0"/>
-                <a:cs typeface="Times New Roman" panose="02020603050405020304" pitchFamily="18" charset="0"/>
-              </a:rPr>
-              <a:t>[1] Mecanismos e Arquitetura de Computação em Nuvem</a:t>
-            </a:r>
-          </a:p>
-          <a:p>
-            <a:pPr marL="0" indent="0" algn="just">
-              <a:buNone/>
+                <a:solidFill>
+                  <a:schemeClr val="tx1"/>
+                </a:solidFill>
+                <a:latin typeface="Times" panose="02020603050405020304" pitchFamily="18" charset="0"/>
+                <a:cs typeface="Times" panose="02020603050405020304" pitchFamily="18" charset="0"/>
+              </a:rPr>
+              <a:t>VM (</a:t>
+            </a:r>
+            <a:r>
+              <a:rPr lang="pt-BR" sz="2000" b="1" dirty="0">
+                <a:solidFill>
+                  <a:schemeClr val="tx1"/>
+                </a:solidFill>
+                <a:latin typeface="Times" panose="02020603050405020304" pitchFamily="18" charset="0"/>
+                <a:cs typeface="Times" panose="02020603050405020304" pitchFamily="18" charset="0"/>
+              </a:rPr>
+              <a:t>EC2</a:t>
+            </a:r>
+            <a:r>
+              <a:rPr lang="pt-BR" sz="2000" dirty="0">
+                <a:solidFill>
+                  <a:schemeClr val="tx1"/>
+                </a:solidFill>
+                <a:latin typeface="Times" panose="02020603050405020304" pitchFamily="18" charset="0"/>
+                <a:cs typeface="Times" panose="02020603050405020304" pitchFamily="18" charset="0"/>
+              </a:rPr>
+              <a:t>)</a:t>
+            </a:r>
+          </a:p>
+          <a:p>
+            <a:pPr algn="just">
+              <a:buFont typeface="Wingdings" panose="05000000000000000000" pitchFamily="2" charset="2"/>
+              <a:buChar char="§"/>
             </a:pPr>
             <a:r>
-              <a:rPr lang="pt-BR" sz="2000" b="1" dirty="0">
-                <a:solidFill>
-                  <a:srgbClr val="FF0000"/>
-                </a:solidFill>
-                <a:latin typeface="Times New Roman" panose="02020603050405020304" pitchFamily="18" charset="0"/>
-                <a:cs typeface="Times New Roman" panose="02020603050405020304" pitchFamily="18" charset="0"/>
-              </a:rPr>
-              <a:t>Disponível em:</a:t>
-            </a:r>
-          </a:p>
-          <a:p>
-            <a:pPr marL="0" indent="0" algn="just">
-              <a:buNone/>
+              <a:rPr lang="pt-BR" sz="2000" dirty="0">
+                <a:solidFill>
+                  <a:schemeClr val="tx1"/>
+                </a:solidFill>
+                <a:latin typeface="Times" panose="02020603050405020304" pitchFamily="18" charset="0"/>
+                <a:cs typeface="Times" panose="02020603050405020304" pitchFamily="18" charset="0"/>
+              </a:rPr>
+              <a:t>Computação.</a:t>
+            </a:r>
+          </a:p>
+          <a:p>
+            <a:pPr algn="just">
+              <a:buFont typeface="Wingdings" panose="05000000000000000000" pitchFamily="2" charset="2"/>
+              <a:buChar char="§"/>
             </a:pPr>
             <a:r>
-              <a:rPr lang="pt-BR" sz="2000" b="1" dirty="0">
-                <a:solidFill>
-                  <a:srgbClr val="FF0000"/>
-                </a:solidFill>
-                <a:latin typeface="Times New Roman" panose="02020603050405020304" pitchFamily="18" charset="0"/>
-                <a:cs typeface="Times New Roman" panose="02020603050405020304" pitchFamily="18" charset="0"/>
+              <a:rPr lang="pt-BR" sz="2000" dirty="0">
+                <a:solidFill>
+                  <a:schemeClr val="tx1"/>
+                </a:solidFill>
+                <a:latin typeface="Times" panose="02020603050405020304" pitchFamily="18" charset="0"/>
+                <a:cs typeface="Times" panose="02020603050405020304" pitchFamily="18" charset="0"/>
+              </a:rPr>
+              <a:t>Armazenamento.</a:t>
+            </a:r>
+          </a:p>
+          <a:p>
+            <a:pPr algn="just">
+              <a:buFont typeface="Wingdings" panose="05000000000000000000" pitchFamily="2" charset="2"/>
+              <a:buChar char="§"/>
+            </a:pPr>
+            <a:r>
+              <a:rPr lang="pt-BR" sz="2000" dirty="0">
+                <a:solidFill>
+                  <a:schemeClr val="tx1"/>
+                </a:solidFill>
+                <a:latin typeface="Times" panose="02020603050405020304" pitchFamily="18" charset="0"/>
+                <a:cs typeface="Times" panose="02020603050405020304" pitchFamily="18" charset="0"/>
+              </a:rPr>
+              <a:t>Banco de dados.</a:t>
+            </a:r>
+          </a:p>
+          <a:p>
+            <a:pPr algn="just">
+              <a:buFont typeface="Wingdings" panose="05000000000000000000" pitchFamily="2" charset="2"/>
+              <a:buChar char="§"/>
+            </a:pPr>
+            <a:r>
+              <a:rPr lang="pt-BR" sz="2000" dirty="0">
+                <a:solidFill>
+                  <a:schemeClr val="tx1"/>
+                </a:solidFill>
+                <a:latin typeface="Times" panose="02020603050405020304" pitchFamily="18" charset="0"/>
+                <a:cs typeface="Times" panose="02020603050405020304" pitchFamily="18" charset="0"/>
+              </a:rPr>
+              <a:t>Redes e entrega de conteúdo.</a:t>
+            </a:r>
+          </a:p>
+          <a:p>
+            <a:pPr algn="just">
+              <a:buFont typeface="Wingdings" panose="05000000000000000000" pitchFamily="2" charset="2"/>
+              <a:buChar char="§"/>
+            </a:pPr>
+            <a:r>
+              <a:rPr lang="pt-BR" sz="2000" dirty="0">
+                <a:solidFill>
+                  <a:schemeClr val="tx1"/>
+                </a:solidFill>
+                <a:latin typeface="Times" panose="02020603050405020304" pitchFamily="18" charset="0"/>
+                <a:cs typeface="Times" panose="02020603050405020304" pitchFamily="18" charset="0"/>
+              </a:rPr>
+              <a:t>Análises.</a:t>
+            </a:r>
+          </a:p>
+          <a:p>
+            <a:pPr algn="just">
+              <a:buFont typeface="Wingdings" panose="05000000000000000000" pitchFamily="2" charset="2"/>
+              <a:buChar char="§"/>
+            </a:pPr>
+            <a:r>
+              <a:rPr lang="pt-BR" sz="2000" dirty="0" err="1">
+                <a:solidFill>
+                  <a:schemeClr val="tx1"/>
+                </a:solidFill>
+                <a:latin typeface="Times" panose="02020603050405020304" pitchFamily="18" charset="0"/>
+                <a:cs typeface="Times" panose="02020603050405020304" pitchFamily="18" charset="0"/>
+              </a:rPr>
+              <a:t>Machine</a:t>
+            </a:r>
+            <a:r>
+              <a:rPr lang="pt-BR" sz="2000" dirty="0">
+                <a:solidFill>
+                  <a:schemeClr val="tx1"/>
+                </a:solidFill>
+                <a:latin typeface="Times" panose="02020603050405020304" pitchFamily="18" charset="0"/>
+                <a:cs typeface="Times" panose="02020603050405020304" pitchFamily="18" charset="0"/>
               </a:rPr>
               <a:t> </a:t>
             </a:r>
             <a:r>
+              <a:rPr lang="pt-BR" sz="2000" dirty="0" err="1">
+                <a:solidFill>
+                  <a:schemeClr val="tx1"/>
+                </a:solidFill>
+                <a:latin typeface="Times" panose="02020603050405020304" pitchFamily="18" charset="0"/>
+                <a:cs typeface="Times" panose="02020603050405020304" pitchFamily="18" charset="0"/>
+              </a:rPr>
+              <a:t>learning</a:t>
+            </a:r>
+            <a:r>
               <a:rPr lang="pt-BR" sz="2000" dirty="0">
-                <a:latin typeface="Times New Roman" panose="02020603050405020304" pitchFamily="18" charset="0"/>
-                <a:cs typeface="Times New Roman" panose="02020603050405020304" pitchFamily="18" charset="0"/>
-                <a:hlinkClick r:id="rId3"/>
-              </a:rPr>
-              <a:t>https://www.gta.ufrj.br/ensino/eel879/trabalhos_vf_2009_2/seabra/componentes.html</a:t>
-            </a:r>
-            <a:endParaRPr lang="pt-BR" sz="2000" dirty="0">
-              <a:latin typeface="Times New Roman" panose="02020603050405020304" pitchFamily="18" charset="0"/>
-              <a:cs typeface="Times New Roman" panose="02020603050405020304" pitchFamily="18" charset="0"/>
-            </a:endParaRPr>
-          </a:p>
-          <a:p>
-            <a:pPr marL="0" indent="0" algn="just">
-              <a:buNone/>
+                <a:solidFill>
+                  <a:schemeClr val="tx1"/>
+                </a:solidFill>
+                <a:latin typeface="Times" panose="02020603050405020304" pitchFamily="18" charset="0"/>
+                <a:cs typeface="Times" panose="02020603050405020304" pitchFamily="18" charset="0"/>
+              </a:rPr>
+              <a:t>.</a:t>
+            </a:r>
+          </a:p>
+          <a:p>
+            <a:pPr algn="just">
+              <a:buFont typeface="Wingdings" panose="05000000000000000000" pitchFamily="2" charset="2"/>
+              <a:buChar char="§"/>
             </a:pPr>
-            <a:endParaRPr lang="pt-BR" sz="2000" dirty="0">
-              <a:latin typeface="Times New Roman" panose="02020603050405020304" pitchFamily="18" charset="0"/>
-              <a:cs typeface="Times New Roman" panose="02020603050405020304" pitchFamily="18" charset="0"/>
-            </a:endParaRPr>
-          </a:p>
-          <a:p>
-            <a:pPr marL="0" indent="0" algn="just">
-              <a:buNone/>
-            </a:pPr>
             <a:r>
               <a:rPr lang="pt-BR" sz="2000" dirty="0">
-                <a:latin typeface="Times New Roman" panose="02020603050405020304" pitchFamily="18" charset="0"/>
-                <a:cs typeface="Times New Roman" panose="02020603050405020304" pitchFamily="18" charset="0"/>
-              </a:rPr>
-              <a:t>[2] AWS - Arquitetura de Computação em Nuvem. </a:t>
-            </a:r>
-          </a:p>
-          <a:p>
-            <a:pPr marL="0" indent="0" algn="just">
-              <a:buNone/>
-            </a:pPr>
-            <a:r>
-              <a:rPr lang="pt-BR" sz="2000" b="1" dirty="0">
-                <a:solidFill>
-                  <a:srgbClr val="FF0000"/>
-                </a:solidFill>
-                <a:latin typeface="Times New Roman" panose="02020603050405020304" pitchFamily="18" charset="0"/>
-                <a:cs typeface="Times New Roman" panose="02020603050405020304" pitchFamily="18" charset="0"/>
-              </a:rPr>
-              <a:t>Disponível em: </a:t>
-            </a:r>
-            <a:r>
-              <a:rPr lang="pt-BR" sz="2000" dirty="0">
-                <a:latin typeface="Times New Roman" panose="02020603050405020304" pitchFamily="18" charset="0"/>
-                <a:cs typeface="Times New Roman" panose="02020603050405020304" pitchFamily="18" charset="0"/>
-                <a:hlinkClick r:id="rId4"/>
-              </a:rPr>
-              <a:t>https://aws.amazon.com/pt/training/awsacademy/cloud-computing-architecture/</a:t>
-            </a:r>
-            <a:endParaRPr lang="pt-BR" sz="2000" dirty="0">
-              <a:latin typeface="Times New Roman" panose="02020603050405020304" pitchFamily="18" charset="0"/>
-              <a:cs typeface="Times New Roman" panose="02020603050405020304" pitchFamily="18" charset="0"/>
-            </a:endParaRPr>
-          </a:p>
-          <a:p>
-            <a:pPr marL="0" indent="0" algn="just">
-              <a:buNone/>
-            </a:pPr>
-            <a:endParaRPr lang="pt-BR" sz="2000" dirty="0">
-              <a:latin typeface="Times New Roman" panose="02020603050405020304" pitchFamily="18" charset="0"/>
-              <a:cs typeface="Times New Roman" panose="02020603050405020304" pitchFamily="18" charset="0"/>
-            </a:endParaRPr>
-          </a:p>
-          <a:p>
-            <a:pPr marL="0" indent="0" algn="just">
-              <a:buNone/>
-            </a:pPr>
-            <a:endParaRPr lang="pt-BR" sz="2000" dirty="0">
-              <a:latin typeface="Calibri" panose="020F0502020204030204" pitchFamily="34" charset="0"/>
-            </a:endParaRPr>
+                <a:solidFill>
+                  <a:schemeClr val="tx1"/>
+                </a:solidFill>
+                <a:latin typeface="Times" panose="02020603050405020304" pitchFamily="18" charset="0"/>
+                <a:cs typeface="Times" panose="02020603050405020304" pitchFamily="18" charset="0"/>
+              </a:rPr>
+              <a:t>Segurança, identidade e conformidade.</a:t>
+            </a:r>
           </a:p>
         </p:txBody>
       </p:sp>
     </p:spTree>
     <p:extLst>
       <p:ext uri="{BB962C8B-B14F-4D97-AF65-F5344CB8AC3E}">
-        <p14:creationId xmlns:p14="http://schemas.microsoft.com/office/powerpoint/2010/main" val="4175167667"/>
+        <p14:creationId xmlns:p14="http://schemas.microsoft.com/office/powerpoint/2010/main" val="1102997639"/>
       </p:ext>
     </p:extLst>
   </p:cSld>
@@ -4729,7 +4970,7 @@
                   <a:srgbClr val="0070C0"/>
                 </a:solidFill>
               </a:rPr>
-              <a:t>Aprenda</a:t>
+              <a:t>Leitura</a:t>
             </a:r>
             <a:r>
               <a:rPr lang="en-US" b="1" dirty="0">
@@ -4737,8 +4978,21 @@
                   <a:srgbClr val="0070C0"/>
                 </a:solidFill>
               </a:rPr>
-              <a:t>+</a:t>
-            </a:r>
+              <a:t> </a:t>
+            </a:r>
+            <a:r>
+              <a:rPr lang="en-US" b="1" dirty="0" err="1">
+                <a:solidFill>
+                  <a:srgbClr val="0070C0"/>
+                </a:solidFill>
+              </a:rPr>
+              <a:t>Específica</a:t>
+            </a:r>
+            <a:endParaRPr lang="en-US" b="1" dirty="0">
+              <a:solidFill>
+                <a:srgbClr val="0070C0"/>
+              </a:solidFill>
+            </a:endParaRPr>
           </a:p>
         </p:txBody>
       </p:sp>
@@ -4754,8 +5008,8 @@
         </p:nvSpPr>
         <p:spPr>
           <a:xfrm>
-            <a:off x="142865" y="1200150"/>
-            <a:ext cx="8865056" cy="3737370"/>
+            <a:off x="142865" y="1200151"/>
+            <a:ext cx="8865056" cy="3394472"/>
           </a:xfrm>
         </p:spPr>
         <p:txBody>
@@ -4768,11 +5022,11 @@
               <a:buNone/>
             </a:pPr>
             <a:r>
-              <a:rPr lang="pt-BR" sz="2400" dirty="0">
+              <a:rPr lang="pt-BR" sz="2000" dirty="0">
                 <a:latin typeface="Times New Roman" panose="02020603050405020304" pitchFamily="18" charset="0"/>
                 <a:cs typeface="Times New Roman" panose="02020603050405020304" pitchFamily="18" charset="0"/>
               </a:rPr>
-              <a:t>[1] Mecanismos e Arquitetura de Computação em Nuvem.</a:t>
+              <a:t>[1] Fundamentos Cloud AWS</a:t>
             </a:r>
           </a:p>
           <a:p>
@@ -4780,7 +5034,7 @@
               <a:buNone/>
             </a:pPr>
             <a:r>
-              <a:rPr lang="pt-BR" sz="2400" b="1" dirty="0">
+              <a:rPr lang="pt-BR" sz="2000" b="1" dirty="0">
                 <a:solidFill>
                   <a:srgbClr val="FF0000"/>
                 </a:solidFill>
@@ -4789,15 +5043,64 @@
               </a:rPr>
               <a:t>Disponível em: </a:t>
             </a:r>
-            <a:r>
-              <a:rPr lang="pt-BR" sz="2400" dirty="0">
+          </a:p>
+          <a:p>
+            <a:pPr marL="0" indent="0" algn="just">
+              <a:buNone/>
+            </a:pPr>
+            <a:r>
+              <a:rPr lang="pt-BR" sz="2000" dirty="0">
                 <a:latin typeface="Times New Roman" panose="02020603050405020304" pitchFamily="18" charset="0"/>
                 <a:cs typeface="Times New Roman" panose="02020603050405020304" pitchFamily="18" charset="0"/>
                 <a:hlinkClick r:id="rId3"/>
               </a:rPr>
-              <a:t>https://youtu.be/RWgW-CgdIk0</a:t>
-            </a:r>
-            <a:endParaRPr lang="pt-BR" sz="2400" dirty="0">
+              <a:t>https://aws.amazon.com/</a:t>
+            </a:r>
+            <a:r>
+              <a:rPr lang="pt-BR" sz="2000" dirty="0" err="1">
+                <a:latin typeface="Times New Roman" panose="02020603050405020304" pitchFamily="18" charset="0"/>
+                <a:cs typeface="Times New Roman" panose="02020603050405020304" pitchFamily="18" charset="0"/>
+                <a:hlinkClick r:id="rId3"/>
+              </a:rPr>
+              <a:t>pt</a:t>
+            </a:r>
+            <a:r>
+              <a:rPr lang="pt-BR" sz="2000" dirty="0">
+                <a:latin typeface="Times New Roman" panose="02020603050405020304" pitchFamily="18" charset="0"/>
+                <a:cs typeface="Times New Roman" panose="02020603050405020304" pitchFamily="18" charset="0"/>
+                <a:hlinkClick r:id="rId3"/>
+              </a:rPr>
+              <a:t>/</a:t>
+            </a:r>
+            <a:r>
+              <a:rPr lang="pt-BR" sz="2000" dirty="0" err="1">
+                <a:latin typeface="Times New Roman" panose="02020603050405020304" pitchFamily="18" charset="0"/>
+                <a:cs typeface="Times New Roman" panose="02020603050405020304" pitchFamily="18" charset="0"/>
+                <a:hlinkClick r:id="rId3"/>
+              </a:rPr>
+              <a:t>getting-started</a:t>
+            </a:r>
+            <a:r>
+              <a:rPr lang="pt-BR" sz="2000" dirty="0">
+                <a:latin typeface="Times New Roman" panose="02020603050405020304" pitchFamily="18" charset="0"/>
+                <a:cs typeface="Times New Roman" panose="02020603050405020304" pitchFamily="18" charset="0"/>
+                <a:hlinkClick r:id="rId3"/>
+              </a:rPr>
+              <a:t>/#:~:text=A%20Amazon%20Web%20Services%20(AWS,dados%2C%20an%C3%A1lises%20e%20muito%20mais</a:t>
+            </a:r>
+            <a:r>
+              <a:rPr lang="pt-BR" sz="2000" dirty="0">
+                <a:latin typeface="Times New Roman" panose="02020603050405020304" pitchFamily="18" charset="0"/>
+                <a:cs typeface="Times New Roman" panose="02020603050405020304" pitchFamily="18" charset="0"/>
+              </a:rPr>
+              <a:t>.</a:t>
+            </a:r>
+          </a:p>
+          <a:p>
+            <a:pPr marL="0" indent="0" algn="just">
+              <a:buNone/>
+            </a:pPr>
+            <a:endParaRPr lang="pt-BR" sz="2000" dirty="0">
               <a:latin typeface="Times New Roman" panose="02020603050405020304" pitchFamily="18" charset="0"/>
               <a:cs typeface="Times New Roman" panose="02020603050405020304" pitchFamily="18" charset="0"/>
             </a:endParaRPr>
@@ -4807,11 +5110,25 @@
               <a:buNone/>
             </a:pPr>
             <a:r>
-              <a:rPr lang="pt-BR" sz="2400" dirty="0">
+              <a:rPr lang="pt-BR" sz="2000" dirty="0">
                 <a:latin typeface="Times New Roman" panose="02020603050405020304" pitchFamily="18" charset="0"/>
                 <a:cs typeface="Times New Roman" panose="02020603050405020304" pitchFamily="18" charset="0"/>
               </a:rPr>
-              <a:t>		  </a:t>
+              <a:t>[2] </a:t>
+            </a:r>
+            <a:r>
+              <a:rPr lang="en-US" sz="2000" dirty="0">
+                <a:latin typeface="Times New Roman" panose="02020603050405020304" pitchFamily="18" charset="0"/>
+                <a:cs typeface="Times New Roman" panose="02020603050405020304" pitchFamily="18" charset="0"/>
+              </a:rPr>
+              <a:t>Comparison and Analysis of Cloud Service Providers-AWs, Microsoft and Google</a:t>
+            </a:r>
+            <a:r>
+              <a:rPr lang="pt-BR" sz="2000" dirty="0">
+                <a:latin typeface="Times New Roman" panose="02020603050405020304" pitchFamily="18" charset="0"/>
+                <a:cs typeface="Times New Roman" panose="02020603050405020304" pitchFamily="18" charset="0"/>
+              </a:rPr>
+              <a:t>. </a:t>
             </a:r>
           </a:p>
           <a:p>
@@ -4819,36 +5136,33 @@
               <a:buNone/>
             </a:pPr>
             <a:r>
-              <a:rPr lang="pt-BR" sz="2400" dirty="0">
+              <a:rPr lang="pt-BR" sz="2000" b="1" dirty="0">
+                <a:solidFill>
+                  <a:srgbClr val="FF0000"/>
+                </a:solidFill>
                 <a:latin typeface="Times New Roman" panose="02020603050405020304" pitchFamily="18" charset="0"/>
                 <a:cs typeface="Times New Roman" panose="02020603050405020304" pitchFamily="18" charset="0"/>
               </a:rPr>
-              <a:t>[2] AWS - Arquitetura de Computação em Nuvem. </a:t>
-            </a:r>
+              <a:t>Disponível em: </a:t>
+            </a:r>
+            <a:r>
+              <a:rPr lang="pt-BR" sz="2000" dirty="0">
+                <a:latin typeface="Times New Roman" panose="02020603050405020304" pitchFamily="18" charset="0"/>
+                <a:cs typeface="Times New Roman" panose="02020603050405020304" pitchFamily="18" charset="0"/>
+                <a:hlinkClick r:id="rId4"/>
+              </a:rPr>
+              <a:t>https://ieeexplore.ieee.org/abstract/document/9337100</a:t>
+            </a:r>
+            <a:endParaRPr lang="pt-BR" sz="2000" dirty="0">
+              <a:latin typeface="Times New Roman" panose="02020603050405020304" pitchFamily="18" charset="0"/>
+              <a:cs typeface="Times New Roman" panose="02020603050405020304" pitchFamily="18" charset="0"/>
+            </a:endParaRPr>
           </a:p>
           <a:p>
             <a:pPr marL="0" indent="0" algn="just">
               <a:buNone/>
             </a:pPr>
-            <a:r>
-              <a:rPr lang="pt-BR" sz="2400" b="1" dirty="0">
-                <a:solidFill>
-                  <a:srgbClr val="FF0000"/>
-                </a:solidFill>
-                <a:latin typeface="Times New Roman" panose="02020603050405020304" pitchFamily="18" charset="0"/>
-                <a:cs typeface="Times New Roman" panose="02020603050405020304" pitchFamily="18" charset="0"/>
-              </a:rPr>
-              <a:t>Disponível em: </a:t>
-            </a:r>
-            <a:r>
-              <a:rPr lang="pt-BR" sz="2400" dirty="0">
-                <a:latin typeface="Times New Roman" panose="02020603050405020304" pitchFamily="18" charset="0"/>
-                <a:cs typeface="Times New Roman" panose="02020603050405020304" pitchFamily="18" charset="0"/>
-                <a:hlinkClick r:id="rId4"/>
-              </a:rPr>
-              <a:t>https://www.youtube.com/watch?v=Z3SYDTMP3ME</a:t>
-            </a:r>
-            <a:endParaRPr lang="pt-BR" sz="2400" dirty="0">
+            <a:endParaRPr lang="pt-BR" sz="2000" dirty="0">
               <a:latin typeface="Times New Roman" panose="02020603050405020304" pitchFamily="18" charset="0"/>
               <a:cs typeface="Times New Roman" panose="02020603050405020304" pitchFamily="18" charset="0"/>
             </a:endParaRPr>
@@ -4857,9 +5171,26 @@
             <a:pPr marL="0" indent="0" algn="just">
               <a:buNone/>
             </a:pPr>
-            <a:endParaRPr lang="pt-BR" sz="2400" dirty="0">
+            <a:endParaRPr lang="pt-BR" sz="2000" dirty="0">
               <a:latin typeface="Times New Roman" panose="02020603050405020304" pitchFamily="18" charset="0"/>
               <a:cs typeface="Times New Roman" panose="02020603050405020304" pitchFamily="18" charset="0"/>
+            </a:endParaRPr>
+          </a:p>
+          <a:p>
+            <a:pPr marL="0" indent="0" algn="just">
+              <a:buNone/>
+            </a:pPr>
+            <a:endParaRPr lang="pt-BR" sz="2000" dirty="0">
+              <a:latin typeface="Times New Roman" panose="02020603050405020304" pitchFamily="18" charset="0"/>
+              <a:cs typeface="Times New Roman" panose="02020603050405020304" pitchFamily="18" charset="0"/>
+            </a:endParaRPr>
+          </a:p>
+          <a:p>
+            <a:pPr marL="0" indent="0" algn="just">
+              <a:buNone/>
+            </a:pPr>
+            <a:endParaRPr lang="pt-BR" sz="2000" dirty="0">
+              <a:latin typeface="Calibri" panose="020F0502020204030204" pitchFamily="34" charset="0"/>
             </a:endParaRPr>
           </a:p>
         </p:txBody>
@@ -4867,7 +5198,7 @@
     </p:spTree>
     <p:extLst>
       <p:ext uri="{BB962C8B-B14F-4D97-AF65-F5344CB8AC3E}">
-        <p14:creationId xmlns:p14="http://schemas.microsoft.com/office/powerpoint/2010/main" val="2747596967"/>
+        <p14:creationId xmlns:p14="http://schemas.microsoft.com/office/powerpoint/2010/main" val="4175167667"/>
       </p:ext>
     </p:extLst>
   </p:cSld>
@@ -4923,7 +5254,7 @@
                   <a:srgbClr val="0070C0"/>
                 </a:solidFill>
               </a:rPr>
-              <a:t>Dinâmica</a:t>
+              <a:t>Aprenda</a:t>
             </a:r>
             <a:r>
               <a:rPr lang="en-US" b="1" dirty="0">
@@ -4931,21 +5262,8 @@
                   <a:srgbClr val="0070C0"/>
                 </a:solidFill>
               </a:rPr>
-              <a:t>/</a:t>
-            </a:r>
-            <a:r>
-              <a:rPr lang="en-US" b="1" dirty="0" err="1">
-                <a:solidFill>
-                  <a:srgbClr val="0070C0"/>
-                </a:solidFill>
-              </a:rPr>
-              <a:t>Atividades</a:t>
-            </a:r>
-            <a:endParaRPr lang="en-US" b="1" dirty="0">
-              <a:solidFill>
-                <a:srgbClr val="0070C0"/>
-              </a:solidFill>
-            </a:endParaRPr>
+              <a:t>+</a:t>
+            </a:r>
           </a:p>
         </p:txBody>
       </p:sp>
@@ -4961,8 +5279,8 @@
         </p:nvSpPr>
         <p:spPr>
           <a:xfrm>
-            <a:off x="139472" y="1063230"/>
-            <a:ext cx="8865056" cy="3606305"/>
+            <a:off x="142865" y="1200150"/>
+            <a:ext cx="8865056" cy="3737370"/>
           </a:xfrm>
         </p:spPr>
         <p:txBody>
@@ -4975,18 +5293,50 @@
               <a:buNone/>
             </a:pPr>
             <a:r>
-              <a:rPr lang="pt-BR" sz="2000" dirty="0">
+              <a:rPr lang="pt-BR" sz="2400" dirty="0">
                 <a:latin typeface="Times New Roman" panose="02020603050405020304" pitchFamily="18" charset="0"/>
                 <a:cs typeface="Times New Roman" panose="02020603050405020304" pitchFamily="18" charset="0"/>
               </a:rPr>
-              <a:t>Exercícios (Atividade Verificadora de Aprendizagem)</a:t>
+              <a:t>[1] Plataforma Cloud </a:t>
+            </a:r>
+            <a:r>
+              <a:rPr lang="pt-BR" sz="2400" dirty="0" err="1">
+                <a:latin typeface="Times New Roman" panose="02020603050405020304" pitchFamily="18" charset="0"/>
+                <a:cs typeface="Times New Roman" panose="02020603050405020304" pitchFamily="18" charset="0"/>
+              </a:rPr>
+              <a:t>Computing</a:t>
+            </a:r>
+            <a:r>
+              <a:rPr lang="pt-BR" sz="2400" dirty="0">
+                <a:latin typeface="Times New Roman" panose="02020603050405020304" pitchFamily="18" charset="0"/>
+                <a:cs typeface="Times New Roman" panose="02020603050405020304" pitchFamily="18" charset="0"/>
+              </a:rPr>
+              <a:t> AWS.</a:t>
             </a:r>
           </a:p>
           <a:p>
             <a:pPr marL="0" indent="0" algn="just">
               <a:buNone/>
             </a:pPr>
-            <a:endParaRPr lang="pt-BR" sz="2000" dirty="0">
+            <a:r>
+              <a:rPr lang="pt-BR" sz="2400" b="1" dirty="0">
+                <a:solidFill>
+                  <a:srgbClr val="FF0000"/>
+                </a:solidFill>
+                <a:latin typeface="Times New Roman" panose="02020603050405020304" pitchFamily="18" charset="0"/>
+                <a:cs typeface="Times New Roman" panose="02020603050405020304" pitchFamily="18" charset="0"/>
+              </a:rPr>
+              <a:t>Disponível em: </a:t>
+            </a:r>
+            <a:r>
+              <a:rPr lang="pt-BR" sz="2400" dirty="0">
+                <a:latin typeface="Times New Roman" panose="02020603050405020304" pitchFamily="18" charset="0"/>
+                <a:cs typeface="Times New Roman" panose="02020603050405020304" pitchFamily="18" charset="0"/>
+                <a:hlinkClick r:id="rId3"/>
+              </a:rPr>
+              <a:t>https://youtu.be/a9__D53WsUs</a:t>
+            </a:r>
+            <a:endParaRPr lang="pt-BR" sz="2400" dirty="0">
               <a:latin typeface="Times New Roman" panose="02020603050405020304" pitchFamily="18" charset="0"/>
               <a:cs typeface="Times New Roman" panose="02020603050405020304" pitchFamily="18" charset="0"/>
             </a:endParaRPr>
@@ -4995,22 +5345,66 @@
             <a:pPr marL="0" indent="0" algn="just">
               <a:buNone/>
             </a:pPr>
-            <a:r>
-              <a:rPr lang="pt-BR" sz="2000" dirty="0">
+            <a:endParaRPr lang="pt-BR" sz="2400" dirty="0">
+              <a:latin typeface="Times New Roman" panose="02020603050405020304" pitchFamily="18" charset="0"/>
+              <a:cs typeface="Times New Roman" panose="02020603050405020304" pitchFamily="18" charset="0"/>
+            </a:endParaRPr>
+          </a:p>
+          <a:p>
+            <a:pPr marL="0" indent="0" algn="just">
+              <a:buNone/>
+            </a:pPr>
+            <a:endParaRPr lang="pt-BR" sz="2400" dirty="0">
+              <a:latin typeface="Times New Roman" panose="02020603050405020304" pitchFamily="18" charset="0"/>
+              <a:cs typeface="Times New Roman" panose="02020603050405020304" pitchFamily="18" charset="0"/>
+            </a:endParaRPr>
+          </a:p>
+          <a:p>
+            <a:pPr marL="0" indent="0" algn="just">
+              <a:buNone/>
+            </a:pPr>
+            <a:r>
+              <a:rPr lang="pt-BR" sz="2400" dirty="0">
                 <a:latin typeface="Times New Roman" panose="02020603050405020304" pitchFamily="18" charset="0"/>
                 <a:cs typeface="Times New Roman" panose="02020603050405020304" pitchFamily="18" charset="0"/>
               </a:rPr>
-              <a:t>- </a:t>
-            </a:r>
-            <a:r>
-              <a:rPr lang="pt-BR" sz="2000" b="1" dirty="0">
+              <a:t>[2] AWS - Arquitetura de Computação em Nuvem. </a:t>
+            </a:r>
+          </a:p>
+          <a:p>
+            <a:pPr marL="0" indent="0" algn="just">
+              <a:buNone/>
+            </a:pPr>
+            <a:r>
+              <a:rPr lang="pt-BR" sz="2400" b="1" dirty="0">
+                <a:solidFill>
+                  <a:srgbClr val="FF0000"/>
+                </a:solidFill>
                 <a:latin typeface="Times New Roman" panose="02020603050405020304" pitchFamily="18" charset="0"/>
                 <a:cs typeface="Times New Roman" panose="02020603050405020304" pitchFamily="18" charset="0"/>
               </a:rPr>
-              <a:t>Quiz</a:t>
-            </a:r>
-            <a:endParaRPr lang="pt-BR" sz="2000" dirty="0">
-              <a:latin typeface="Calibri" panose="020F0502020204030204" pitchFamily="34" charset="0"/>
+              <a:t>Disponível em: </a:t>
+            </a:r>
+            <a:r>
+              <a:rPr lang="pt-BR" sz="2400" dirty="0">
+                <a:latin typeface="Times New Roman" panose="02020603050405020304" pitchFamily="18" charset="0"/>
+                <a:cs typeface="Times New Roman" panose="02020603050405020304" pitchFamily="18" charset="0"/>
+                <a:hlinkClick r:id="rId4"/>
+              </a:rPr>
+              <a:t>https://www.youtube.com/watch?v=Z3SYDTMP3ME</a:t>
+            </a:r>
+            <a:endParaRPr lang="pt-BR" sz="2400" dirty="0">
+              <a:latin typeface="Times New Roman" panose="02020603050405020304" pitchFamily="18" charset="0"/>
+              <a:cs typeface="Times New Roman" panose="02020603050405020304" pitchFamily="18" charset="0"/>
+            </a:endParaRPr>
+          </a:p>
+          <a:p>
+            <a:pPr marL="0" indent="0" algn="just">
+              <a:buNone/>
+            </a:pPr>
+            <a:endParaRPr lang="pt-BR" sz="2400" dirty="0">
+              <a:latin typeface="Times New Roman" panose="02020603050405020304" pitchFamily="18" charset="0"/>
+              <a:cs typeface="Times New Roman" panose="02020603050405020304" pitchFamily="18" charset="0"/>
             </a:endParaRPr>
           </a:p>
         </p:txBody>
@@ -5018,7 +5412,7 @@
     </p:spTree>
     <p:extLst>
       <p:ext uri="{BB962C8B-B14F-4D97-AF65-F5344CB8AC3E}">
-        <p14:creationId xmlns:p14="http://schemas.microsoft.com/office/powerpoint/2010/main" val="2470652989"/>
+        <p14:creationId xmlns:p14="http://schemas.microsoft.com/office/powerpoint/2010/main" val="2747596967"/>
       </p:ext>
     </p:extLst>
   </p:cSld>
@@ -5074,6 +5468,184 @@
                   <a:srgbClr val="0070C0"/>
                 </a:solidFill>
               </a:rPr>
+              <a:t>Dinâmica</a:t>
+            </a:r>
+            <a:r>
+              <a:rPr lang="en-US" b="1" dirty="0">
+                <a:solidFill>
+                  <a:srgbClr val="0070C0"/>
+                </a:solidFill>
+              </a:rPr>
+              <a:t>/</a:t>
+            </a:r>
+            <a:r>
+              <a:rPr lang="en-US" b="1" dirty="0" err="1">
+                <a:solidFill>
+                  <a:srgbClr val="0070C0"/>
+                </a:solidFill>
+              </a:rPr>
+              <a:t>Atividades</a:t>
+            </a:r>
+            <a:endParaRPr lang="en-US" b="1" dirty="0">
+              <a:solidFill>
+                <a:srgbClr val="0070C0"/>
+              </a:solidFill>
+            </a:endParaRPr>
+          </a:p>
+        </p:txBody>
+      </p:sp>
+      <p:sp>
+        <p:nvSpPr>
+          <p:cNvPr id="8" name="Text Placeholder 2"/>
+          <p:cNvSpPr>
+            <a:spLocks noGrp="1"/>
+          </p:cNvSpPr>
+          <p:nvPr>
+            <p:ph type="body" sz="half" idx="1"/>
+          </p:nvPr>
+        </p:nvSpPr>
+        <p:spPr>
+          <a:xfrm>
+            <a:off x="139472" y="1063230"/>
+            <a:ext cx="8865056" cy="3606305"/>
+          </a:xfrm>
+        </p:spPr>
+        <p:txBody>
+          <a:bodyPr>
+            <a:noAutofit/>
+          </a:bodyPr>
+          <a:lstStyle/>
+          <a:p>
+            <a:pPr marL="0" indent="0" algn="just">
+              <a:buNone/>
+            </a:pPr>
+            <a:r>
+              <a:rPr lang="pt-BR" sz="2000" dirty="0">
+                <a:latin typeface="Times New Roman" panose="02020603050405020304" pitchFamily="18" charset="0"/>
+                <a:cs typeface="Times New Roman" panose="02020603050405020304" pitchFamily="18" charset="0"/>
+              </a:rPr>
+              <a:t>Exercícios (Atividade Verificadora de Aprendizagem)</a:t>
+            </a:r>
+          </a:p>
+          <a:p>
+            <a:pPr marL="0" indent="0" algn="just">
+              <a:buNone/>
+            </a:pPr>
+            <a:endParaRPr lang="pt-BR" sz="2000" dirty="0">
+              <a:latin typeface="Times New Roman" panose="02020603050405020304" pitchFamily="18" charset="0"/>
+              <a:cs typeface="Times New Roman" panose="02020603050405020304" pitchFamily="18" charset="0"/>
+            </a:endParaRPr>
+          </a:p>
+          <a:p>
+            <a:pPr algn="just">
+              <a:buFontTx/>
+              <a:buChar char="-"/>
+            </a:pPr>
+            <a:r>
+              <a:rPr lang="pt-BR" sz="2000" b="1" dirty="0">
+                <a:latin typeface="Times New Roman" panose="02020603050405020304" pitchFamily="18" charset="0"/>
+                <a:cs typeface="Times New Roman" panose="02020603050405020304" pitchFamily="18" charset="0"/>
+              </a:rPr>
+              <a:t>Quiz AWS</a:t>
+            </a:r>
+          </a:p>
+          <a:p>
+            <a:pPr algn="just">
+              <a:buFontTx/>
+              <a:buChar char="-"/>
+            </a:pPr>
+            <a:endParaRPr lang="pt-BR" sz="2000" b="1" dirty="0">
+              <a:latin typeface="Times New Roman" panose="02020603050405020304" pitchFamily="18" charset="0"/>
+              <a:cs typeface="Times New Roman" panose="02020603050405020304" pitchFamily="18" charset="0"/>
+            </a:endParaRPr>
+          </a:p>
+          <a:p>
+            <a:pPr algn="just">
+              <a:buFontTx/>
+              <a:buChar char="-"/>
+            </a:pPr>
+            <a:r>
+              <a:rPr lang="pt-BR" sz="2000" dirty="0">
+                <a:latin typeface="Calibri" panose="020F0502020204030204" pitchFamily="34" charset="0"/>
+                <a:hlinkClick r:id="rId3"/>
+              </a:rPr>
+              <a:t>https://www.w3schools.com/aws/aws_quiz.php</a:t>
+            </a:r>
+            <a:endParaRPr lang="pt-BR" sz="2000" b="1" dirty="0">
+              <a:latin typeface="Times New Roman" panose="02020603050405020304" pitchFamily="18" charset="0"/>
+              <a:cs typeface="Times New Roman" panose="02020603050405020304" pitchFamily="18" charset="0"/>
+            </a:endParaRPr>
+          </a:p>
+          <a:p>
+            <a:pPr algn="just">
+              <a:buFontTx/>
+              <a:buChar char="-"/>
+            </a:pPr>
+            <a:endParaRPr lang="pt-BR" sz="2000" dirty="0">
+              <a:latin typeface="Calibri" panose="020F0502020204030204" pitchFamily="34" charset="0"/>
+            </a:endParaRPr>
+          </a:p>
+        </p:txBody>
+      </p:sp>
+    </p:spTree>
+    <p:extLst>
+      <p:ext uri="{BB962C8B-B14F-4D97-AF65-F5344CB8AC3E}">
+        <p14:creationId xmlns:p14="http://schemas.microsoft.com/office/powerpoint/2010/main" val="2470652989"/>
+      </p:ext>
+    </p:extLst>
+  </p:cSld>
+  <p:clrMapOvr>
+    <a:masterClrMapping/>
+  </p:clrMapOvr>
+  <p:transition spd="med"/>
+</p:sld>
+</file>
+
+<file path=ppt/slides/slide8.xml><?xml version="1.0" encoding="utf-8"?>
+<p:sld xmlns:a="http://schemas.openxmlformats.org/drawingml/2006/main" xmlns:r="http://schemas.openxmlformats.org/officeDocument/2006/relationships" xmlns:p="http://schemas.openxmlformats.org/presentationml/2006/main">
+  <p:cSld>
+    <p:spTree>
+      <p:nvGrpSpPr>
+        <p:cNvPr id="1" name=""/>
+        <p:cNvGrpSpPr/>
+        <p:nvPr/>
+      </p:nvGrpSpPr>
+      <p:grpSpPr>
+        <a:xfrm>
+          <a:off x="0" y="0"/>
+          <a:ext cx="0" cy="0"/>
+          <a:chOff x="0" y="0"/>
+          <a:chExt cx="0" cy="0"/>
+        </a:xfrm>
+      </p:grpSpPr>
+      <p:sp>
+        <p:nvSpPr>
+          <p:cNvPr id="6" name="Title 1"/>
+          <p:cNvSpPr>
+            <a:spLocks noGrp="1"/>
+          </p:cNvSpPr>
+          <p:nvPr>
+            <p:ph type="title"/>
+          </p:nvPr>
+        </p:nvSpPr>
+        <p:spPr>
+          <a:xfrm>
+            <a:off x="457200" y="205980"/>
+            <a:ext cx="8229600" cy="857251"/>
+          </a:xfrm>
+        </p:spPr>
+        <p:txBody>
+          <a:bodyPr>
+            <a:normAutofit/>
+          </a:bodyPr>
+          <a:lstStyle/>
+          <a:p>
+            <a:r>
+              <a:rPr lang="en-US" b="1" dirty="0" err="1">
+                <a:solidFill>
+                  <a:srgbClr val="0070C0"/>
+                </a:solidFill>
+              </a:rPr>
               <a:t>Referências</a:t>
             </a:r>
             <a:r>
@@ -5136,44 +5708,111 @@
               <a:t>[1] </a:t>
             </a:r>
             <a:r>
-              <a:rPr lang="pt-BR" sz="2000" b="1" dirty="0">
+              <a:rPr lang="en-US" sz="2000" b="1" dirty="0">
                 <a:solidFill>
                   <a:srgbClr val="FF0000"/>
                 </a:solidFill>
                 <a:latin typeface="Times New Roman" panose="02020603050405020304" pitchFamily="18" charset="0"/>
                 <a:cs typeface="Times New Roman" panose="02020603050405020304" pitchFamily="18" charset="0"/>
               </a:rPr>
-              <a:t>SOUSA, Flávio RC; MOREIRA, Leonardo O.; MACHADO,</a:t>
-            </a:r>
-            <a:r>
-              <a:rPr lang="pt-BR" sz="2000" dirty="0">
+              <a:t>MUKHERJEE, Sourav. Benefits </a:t>
+            </a:r>
+            <a:r>
+              <a:rPr lang="en-US" sz="2000" dirty="0">
                 <a:solidFill>
                   <a:schemeClr val="tx1"/>
                 </a:solidFill>
                 <a:latin typeface="Times New Roman" panose="02020603050405020304" pitchFamily="18" charset="0"/>
                 <a:cs typeface="Times New Roman" panose="02020603050405020304" pitchFamily="18" charset="0"/>
               </a:rPr>
-              <a:t> </a:t>
-            </a:r>
-            <a:r>
-              <a:rPr lang="pt-BR" sz="2000" dirty="0" err="1">
+              <a:t>of AWS in modern cloud. </a:t>
+            </a:r>
+            <a:r>
+              <a:rPr lang="en-US" sz="2000" dirty="0" err="1">
                 <a:solidFill>
                   <a:schemeClr val="tx1"/>
                 </a:solidFill>
                 <a:latin typeface="Times New Roman" panose="02020603050405020304" pitchFamily="18" charset="0"/>
                 <a:cs typeface="Times New Roman" panose="02020603050405020304" pitchFamily="18" charset="0"/>
               </a:rPr>
-              <a:t>Javam</a:t>
-            </a:r>
-            <a:r>
-              <a:rPr lang="pt-BR" sz="2000" dirty="0">
+              <a:t>arXiv</a:t>
+            </a:r>
+            <a:r>
+              <a:rPr lang="en-US" sz="2000" dirty="0">
                 <a:solidFill>
                   <a:schemeClr val="tx1"/>
                 </a:solidFill>
                 <a:latin typeface="Times New Roman" panose="02020603050405020304" pitchFamily="18" charset="0"/>
                 <a:cs typeface="Times New Roman" panose="02020603050405020304" pitchFamily="18" charset="0"/>
               </a:rPr>
-              <a:t> C. Computação em nuvem: Conceitos, tecnologias, aplicações e desafios. II Escola Regional de Computação Ceará, Maranhão e Piauí (ERCEMAPI), p. 150-175, 2009.</a:t>
+              <a:t> preprint arXiv:1903.03219, 2019.</a:t>
+            </a:r>
+          </a:p>
+          <a:p>
+            <a:pPr marL="0" indent="0" algn="just">
+              <a:buNone/>
+            </a:pPr>
+            <a:endParaRPr lang="en-US" sz="2000" b="1" dirty="0">
+              <a:solidFill>
+                <a:srgbClr val="FF0000"/>
+              </a:solidFill>
+              <a:latin typeface="Times New Roman" panose="02020603050405020304" pitchFamily="18" charset="0"/>
+              <a:cs typeface="Times New Roman" panose="02020603050405020304" pitchFamily="18" charset="0"/>
+            </a:endParaRPr>
+          </a:p>
+          <a:p>
+            <a:pPr marL="0" indent="0" algn="just">
+              <a:buNone/>
+            </a:pPr>
+            <a:r>
+              <a:rPr lang="pt-BR" sz="2000" dirty="0">
+                <a:solidFill>
+                  <a:schemeClr val="tx1"/>
+                </a:solidFill>
+                <a:latin typeface="Times New Roman" panose="02020603050405020304" pitchFamily="18" charset="0"/>
+                <a:cs typeface="Times New Roman" panose="02020603050405020304" pitchFamily="18" charset="0"/>
+              </a:rPr>
+              <a:t>[2] </a:t>
+            </a:r>
+            <a:r>
+              <a:rPr lang="en-US" sz="2000" b="1" dirty="0">
+                <a:solidFill>
+                  <a:srgbClr val="FF0000"/>
+                </a:solidFill>
+                <a:latin typeface="Times New Roman" panose="02020603050405020304" pitchFamily="18" charset="0"/>
+                <a:cs typeface="Times New Roman" panose="02020603050405020304" pitchFamily="18" charset="0"/>
+              </a:rPr>
+              <a:t>NARULA, Saakshi et al. </a:t>
+            </a:r>
+            <a:r>
+              <a:rPr lang="en-US" sz="2000" dirty="0">
+                <a:solidFill>
+                  <a:schemeClr val="tx1"/>
+                </a:solidFill>
+                <a:latin typeface="Times New Roman" panose="02020603050405020304" pitchFamily="18" charset="0"/>
+                <a:cs typeface="Times New Roman" panose="02020603050405020304" pitchFamily="18" charset="0"/>
+              </a:rPr>
+              <a:t>Cloud computing security: Amazon web service. In: 2015 Fifth International Conference on Advanced Computing &amp; Communication Technologies. </a:t>
+            </a:r>
+            <a:r>
+              <a:rPr lang="en-US" sz="2000" dirty="0" err="1">
+                <a:solidFill>
+                  <a:schemeClr val="tx1"/>
+                </a:solidFill>
+                <a:latin typeface="Times New Roman" panose="02020603050405020304" pitchFamily="18" charset="0"/>
+                <a:cs typeface="Times New Roman" panose="02020603050405020304" pitchFamily="18" charset="0"/>
+              </a:rPr>
+              <a:t>ieee</a:t>
+            </a:r>
+            <a:r>
+              <a:rPr lang="en-US" sz="2000" dirty="0">
+                <a:solidFill>
+                  <a:schemeClr val="tx1"/>
+                </a:solidFill>
+                <a:latin typeface="Times New Roman" panose="02020603050405020304" pitchFamily="18" charset="0"/>
+                <a:cs typeface="Times New Roman" panose="02020603050405020304" pitchFamily="18" charset="0"/>
+              </a:rPr>
+              <a:t>, 2015. p. 501-505.</a:t>
             </a:r>
           </a:p>
           <a:p>
@@ -5203,149 +5842,48 @@
                 <a:latin typeface="Times New Roman" panose="02020603050405020304" pitchFamily="18" charset="0"/>
                 <a:cs typeface="Times New Roman" panose="02020603050405020304" pitchFamily="18" charset="0"/>
               </a:rPr>
-              <a:t>[2] </a:t>
-            </a:r>
-            <a:r>
-              <a:rPr lang="pt-BR" sz="2000" b="1" dirty="0">
+              <a:t>[3] </a:t>
+            </a:r>
+            <a:r>
+              <a:rPr lang="en-US" sz="2000" b="1" dirty="0">
                 <a:solidFill>
                   <a:srgbClr val="FF0000"/>
                 </a:solidFill>
                 <a:latin typeface="Times New Roman" panose="02020603050405020304" pitchFamily="18" charset="0"/>
                 <a:cs typeface="Times New Roman" panose="02020603050405020304" pitchFamily="18" charset="0"/>
               </a:rPr>
-              <a:t>TAURION, Cezar.</a:t>
-            </a:r>
-            <a:r>
-              <a:rPr lang="pt-BR" sz="2000" dirty="0">
+              <a:t>MUKHERJEE, Sourav. </a:t>
+            </a:r>
+            <a:r>
+              <a:rPr lang="en-US" sz="2000" dirty="0">
                 <a:solidFill>
                   <a:schemeClr val="tx1"/>
                 </a:solidFill>
                 <a:latin typeface="Times New Roman" panose="02020603050405020304" pitchFamily="18" charset="0"/>
                 <a:cs typeface="Times New Roman" panose="02020603050405020304" pitchFamily="18" charset="0"/>
               </a:rPr>
-              <a:t> Cloud </a:t>
-            </a:r>
-            <a:r>
-              <a:rPr lang="pt-BR" sz="2000" dirty="0" err="1">
+              <a:t>Benefits of AWS in modern cloud. </a:t>
+            </a:r>
+            <a:r>
+              <a:rPr lang="en-US" sz="2000" dirty="0" err="1">
                 <a:solidFill>
                   <a:schemeClr val="tx1"/>
                 </a:solidFill>
                 <a:latin typeface="Times New Roman" panose="02020603050405020304" pitchFamily="18" charset="0"/>
                 <a:cs typeface="Times New Roman" panose="02020603050405020304" pitchFamily="18" charset="0"/>
               </a:rPr>
-              <a:t>computing</a:t>
-            </a:r>
-            <a:r>
-              <a:rPr lang="pt-BR" sz="2000" dirty="0">
+              <a:t>arXiv</a:t>
+            </a:r>
+            <a:r>
+              <a:rPr lang="en-US" sz="2000" dirty="0">
                 <a:solidFill>
                   <a:schemeClr val="tx1"/>
                 </a:solidFill>
                 <a:latin typeface="Times New Roman" panose="02020603050405020304" pitchFamily="18" charset="0"/>
                 <a:cs typeface="Times New Roman" panose="02020603050405020304" pitchFamily="18" charset="0"/>
               </a:rPr>
-              <a:t>-computação em nuvem. </a:t>
-            </a:r>
-            <a:r>
-              <a:rPr lang="pt-BR" sz="2000" dirty="0" err="1">
-                <a:solidFill>
-                  <a:schemeClr val="tx1"/>
-                </a:solidFill>
-                <a:latin typeface="Times New Roman" panose="02020603050405020304" pitchFamily="18" charset="0"/>
-                <a:cs typeface="Times New Roman" panose="02020603050405020304" pitchFamily="18" charset="0"/>
-              </a:rPr>
-              <a:t>Brasport</a:t>
-            </a:r>
-            <a:r>
-              <a:rPr lang="pt-BR" sz="2000" dirty="0">
-                <a:solidFill>
-                  <a:schemeClr val="tx1"/>
-                </a:solidFill>
-                <a:latin typeface="Times New Roman" panose="02020603050405020304" pitchFamily="18" charset="0"/>
-                <a:cs typeface="Times New Roman" panose="02020603050405020304" pitchFamily="18" charset="0"/>
-              </a:rPr>
-              <a:t>, 2009.</a:t>
-            </a:r>
-          </a:p>
-          <a:p>
-            <a:pPr marL="0" indent="0" algn="just">
-              <a:buNone/>
-              <a:tabLst>
-                <a:tab pos="457200" algn="l"/>
-              </a:tabLst>
-            </a:pPr>
-            <a:endParaRPr lang="pt-BR" sz="2000" dirty="0">
-              <a:solidFill>
-                <a:schemeClr val="tx1"/>
-              </a:solidFill>
-              <a:latin typeface="Times New Roman" panose="02020603050405020304" pitchFamily="18" charset="0"/>
-              <a:cs typeface="Times New Roman" panose="02020603050405020304" pitchFamily="18" charset="0"/>
-            </a:endParaRPr>
-          </a:p>
-          <a:p>
-            <a:pPr marL="0" indent="0" algn="just">
-              <a:buNone/>
-              <a:tabLst>
-                <a:tab pos="457200" algn="l"/>
-              </a:tabLst>
-            </a:pPr>
-            <a:r>
-              <a:rPr lang="pt-BR" sz="2000" dirty="0">
-                <a:solidFill>
-                  <a:schemeClr val="tx1"/>
-                </a:solidFill>
-                <a:latin typeface="Times New Roman" panose="02020603050405020304" pitchFamily="18" charset="0"/>
-                <a:cs typeface="Times New Roman" panose="02020603050405020304" pitchFamily="18" charset="0"/>
-              </a:rPr>
-              <a:t>[3] </a:t>
-            </a:r>
-            <a:r>
-              <a:rPr lang="pt-BR" sz="2000" b="1" dirty="0">
-                <a:solidFill>
-                  <a:srgbClr val="FF0000"/>
-                </a:solidFill>
-                <a:latin typeface="Times New Roman" panose="02020603050405020304" pitchFamily="18" charset="0"/>
-                <a:cs typeface="Times New Roman" panose="02020603050405020304" pitchFamily="18" charset="0"/>
-              </a:rPr>
-              <a:t>BATISTA, Bruno Guazzelli.</a:t>
-            </a:r>
-            <a:r>
-              <a:rPr lang="pt-BR" sz="2000" dirty="0">
-                <a:solidFill>
-                  <a:schemeClr val="tx1"/>
-                </a:solidFill>
-                <a:latin typeface="Times New Roman" panose="02020603050405020304" pitchFamily="18" charset="0"/>
-                <a:cs typeface="Times New Roman" panose="02020603050405020304" pitchFamily="18" charset="0"/>
-              </a:rPr>
-              <a:t> Modelos de negócio para ambientes de computação em nuvem que consideram atributos de </a:t>
-            </a:r>
-            <a:r>
-              <a:rPr lang="pt-BR" sz="2000" dirty="0" err="1">
-                <a:solidFill>
-                  <a:schemeClr val="tx1"/>
-                </a:solidFill>
-                <a:latin typeface="Times New Roman" panose="02020603050405020304" pitchFamily="18" charset="0"/>
-                <a:cs typeface="Times New Roman" panose="02020603050405020304" pitchFamily="18" charset="0"/>
-              </a:rPr>
-              <a:t>qos</a:t>
-            </a:r>
-            <a:r>
-              <a:rPr lang="pt-BR" sz="2000" dirty="0">
-                <a:solidFill>
-                  <a:schemeClr val="tx1"/>
-                </a:solidFill>
-                <a:latin typeface="Times New Roman" panose="02020603050405020304" pitchFamily="18" charset="0"/>
-                <a:cs typeface="Times New Roman" panose="02020603050405020304" pitchFamily="18" charset="0"/>
-              </a:rPr>
-              <a:t> relacionados a desempenho e a segurança. 2016. Tese de Doutorado. Universidade de São Paulo.</a:t>
-            </a:r>
-          </a:p>
-          <a:p>
-            <a:pPr marL="0" indent="0" algn="just">
-              <a:buNone/>
-              <a:tabLst>
-                <a:tab pos="457200" algn="l"/>
-              </a:tabLst>
-            </a:pPr>
+              <a:t> preprint arXiv:1903.03219, 2019.</a:t>
+            </a:r>
             <a:endParaRPr lang="pt-BR" sz="2000" dirty="0">
               <a:solidFill>
                 <a:schemeClr val="tx1"/>
@@ -5370,7 +5908,7 @@
 </p:sld>
 </file>
 
-<file path=ppt/slides/slide8.xml><?xml version="1.0" encoding="utf-8"?>
+<file path=ppt/slides/slide9.xml><?xml version="1.0" encoding="utf-8"?>
 <p:sld xmlns:a="http://schemas.openxmlformats.org/drawingml/2006/main" xmlns:r="http://schemas.openxmlformats.org/officeDocument/2006/relationships" xmlns:p="http://schemas.openxmlformats.org/presentationml/2006/main">
   <p:cSld>
     <p:spTree>

</xml_diff>

<commit_message>
Aula 06 Cloud computing AVA 09042023
</commit_message>
<xml_diff>
--- a/01 Classes/Aula 06 - Computação em Nuvem e Web Services em Linux Cloud AWS.pptx
+++ b/01 Classes/Aula 06 - Computação em Nuvem e Web Services em Linux Cloud AWS.pptx
@@ -5486,11 +5486,14 @@
               </a:rPr>
               <a:t>Atividades</a:t>
             </a:r>
-            <a:endParaRPr lang="en-US" b="1" dirty="0">
-              <a:solidFill>
-                <a:srgbClr val="0070C0"/>
-              </a:solidFill>
-            </a:endParaRPr>
+            <a:r>
+              <a:rPr lang="en-US" b="1" dirty="0">
+                <a:solidFill>
+                  <a:srgbClr val="0070C0"/>
+                </a:solidFill>
+              </a:rPr>
+              <a:t> (AVA)</a:t>
+            </a:r>
           </a:p>
         </p:txBody>
       </p:sp>
@@ -5516,27 +5519,6 @@
           </a:bodyPr>
           <a:lstStyle/>
           <a:p>
-            <a:pPr marL="0" indent="0" algn="just">
-              <a:buNone/>
-            </a:pPr>
-            <a:r>
-              <a:rPr lang="pt-BR" sz="2000" dirty="0">
-                <a:latin typeface="Times New Roman" panose="02020603050405020304" pitchFamily="18" charset="0"/>
-                <a:cs typeface="Times New Roman" panose="02020603050405020304" pitchFamily="18" charset="0"/>
-              </a:rPr>
-              <a:t>Exercícios (Atividade Verificadora de Aprendizagem)</a:t>
-            </a:r>
-          </a:p>
-          <a:p>
-            <a:pPr marL="0" indent="0" algn="just">
-              <a:buNone/>
-            </a:pPr>
-            <a:endParaRPr lang="pt-BR" sz="2000" dirty="0">
-              <a:latin typeface="Times New Roman" panose="02020603050405020304" pitchFamily="18" charset="0"/>
-              <a:cs typeface="Times New Roman" panose="02020603050405020304" pitchFamily="18" charset="0"/>
-            </a:endParaRPr>
-          </a:p>
-          <a:p>
             <a:pPr algn="just">
               <a:buFontTx/>
               <a:buChar char="-"/>
@@ -5550,19 +5532,8 @@
             </a:r>
           </a:p>
           <a:p>
-            <a:pPr algn="just">
-              <a:buFontTx/>
-              <a:buChar char="-"/>
-            </a:pPr>
-            <a:endParaRPr lang="pt-BR" sz="2000" b="1" dirty="0">
-              <a:latin typeface="Times New Roman" panose="02020603050405020304" pitchFamily="18" charset="0"/>
-              <a:cs typeface="Times New Roman" panose="02020603050405020304" pitchFamily="18" charset="0"/>
-            </a:endParaRPr>
-          </a:p>
-          <a:p>
-            <a:pPr algn="just">
-              <a:buFontTx/>
-              <a:buChar char="-"/>
+            <a:pPr marL="457200" lvl="1" indent="0" algn="just">
+              <a:buNone/>
             </a:pPr>
             <a:r>
               <a:rPr lang="pt-BR" sz="2000" dirty="0">
@@ -5584,6 +5555,81 @@
             <a:endParaRPr lang="pt-BR" sz="2000" dirty="0">
               <a:latin typeface="Calibri" panose="020F0502020204030204" pitchFamily="34" charset="0"/>
             </a:endParaRPr>
+          </a:p>
+          <a:p>
+            <a:pPr algn="just">
+              <a:buFontTx/>
+              <a:buChar char="-"/>
+            </a:pPr>
+            <a:r>
+              <a:rPr lang="pt-BR" sz="2000" dirty="0">
+                <a:latin typeface="Calibri" panose="020F0502020204030204" pitchFamily="34" charset="0"/>
+              </a:rPr>
+              <a:t>Implementar </a:t>
+            </a:r>
+            <a:r>
+              <a:rPr lang="pt-BR" sz="2000" b="1" dirty="0">
+                <a:latin typeface="Calibri" panose="020F0502020204030204" pitchFamily="34" charset="0"/>
+              </a:rPr>
+              <a:t>CRUD API Python</a:t>
+            </a:r>
+            <a:r>
+              <a:rPr lang="pt-BR" sz="2000" dirty="0">
+                <a:latin typeface="Calibri" panose="020F0502020204030204" pitchFamily="34" charset="0"/>
+              </a:rPr>
+              <a:t> com </a:t>
+            </a:r>
+            <a:r>
+              <a:rPr lang="pt-BR" sz="2000" dirty="0" err="1">
+                <a:latin typeface="Calibri" panose="020F0502020204030204" pitchFamily="34" charset="0"/>
+              </a:rPr>
+              <a:t>MongoDB</a:t>
+            </a:r>
+            <a:r>
+              <a:rPr lang="pt-BR" sz="2000" dirty="0">
+                <a:latin typeface="Calibri" panose="020F0502020204030204" pitchFamily="34" charset="0"/>
+              </a:rPr>
+              <a:t> (hospedando na </a:t>
+            </a:r>
+            <a:r>
+              <a:rPr lang="pt-BR" sz="2000" b="1" dirty="0">
+                <a:solidFill>
+                  <a:srgbClr val="FF0000"/>
+                </a:solidFill>
+                <a:latin typeface="Calibri" panose="020F0502020204030204" pitchFamily="34" charset="0"/>
+              </a:rPr>
+              <a:t>plataforma</a:t>
+            </a:r>
+            <a:r>
+              <a:rPr lang="pt-BR" sz="2000" dirty="0">
+                <a:latin typeface="Calibri" panose="020F0502020204030204" pitchFamily="34" charset="0"/>
+              </a:rPr>
+              <a:t> </a:t>
+            </a:r>
+            <a:r>
+              <a:rPr lang="pt-BR" sz="2000" b="1" dirty="0">
+                <a:solidFill>
+                  <a:srgbClr val="FF0000"/>
+                </a:solidFill>
+                <a:latin typeface="Calibri" panose="020F0502020204030204" pitchFamily="34" charset="0"/>
+              </a:rPr>
+              <a:t>Atlas </a:t>
+            </a:r>
+            <a:r>
+              <a:rPr lang="pt-BR" sz="2000" b="1" dirty="0" err="1">
+                <a:solidFill>
+                  <a:srgbClr val="FF0000"/>
+                </a:solidFill>
+                <a:latin typeface="Calibri" panose="020F0502020204030204" pitchFamily="34" charset="0"/>
+              </a:rPr>
+              <a:t>MongoDB</a:t>
+            </a:r>
+            <a:r>
+              <a:rPr lang="pt-BR" sz="2000" dirty="0">
+                <a:latin typeface="Calibri" panose="020F0502020204030204" pitchFamily="34" charset="0"/>
+              </a:rPr>
+              <a:t>)</a:t>
+            </a:r>
           </a:p>
         </p:txBody>
       </p:sp>

</xml_diff>